<commit_message>
removed copy, exported to pdf
</commit_message>
<xml_diff>
--- a/certificate_analysis/pv204_project_report.pptx
+++ b/certificate_analysis/pv204_project_report.pptx
@@ -149,8 +149,70 @@
 <p1510:revInfo xmlns:a="http://schemas.openxmlformats.org/drawingml/2006/main" xmlns:r="http://schemas.openxmlformats.org/officeDocument/2006/relationships" xmlns:p1510="http://schemas.microsoft.com/office/powerpoint/2015/10/main">
   <p1510:revLst>
     <p1510:client id="{71F7E8E8-63C9-777B-2ABF-B238627A0230}" v="4" dt="2020-03-25T22:53:58.544"/>
+    <p1510:client id="{7D557538-294E-AFFE-B168-478C568E4451}" v="23" dt="2020-03-26T07:32:13.605"/>
   </p1510:revLst>
 </p1510:revInfo>
+</file>
+
+<file path=ppt/changesInfos/changesInfo1.xml><?xml version="1.0" encoding="utf-8"?>
+<pc:chgInfo xmlns:a="http://schemas.openxmlformats.org/drawingml/2006/main" xmlns:r="http://schemas.openxmlformats.org/officeDocument/2006/relationships" xmlns:ac="http://schemas.microsoft.com/office/drawing/2013/main/command" xmlns:pc="http://schemas.microsoft.com/office/powerpoint/2013/main/command">
+  <pc:docChgLst>
+    <pc:chgData name="Anh Minh Tran" userId="S::459379@muni.cz::b3788d88-cf3d-4b77-970d-ad61f246fa46" providerId="AD" clId="Web-{71F7E8E8-63C9-777B-2ABF-B238627A0230}"/>
+    <pc:docChg chg="modSld">
+      <pc:chgData name="Anh Minh Tran" userId="S::459379@muni.cz::b3788d88-cf3d-4b77-970d-ad61f246fa46" providerId="AD" clId="Web-{71F7E8E8-63C9-777B-2ABF-B238627A0230}" dt="2020-03-25T22:53:58.544" v="3" actId="20577"/>
+      <pc:docMkLst>
+        <pc:docMk/>
+      </pc:docMkLst>
+      <pc:sldChg chg="modSp">
+        <pc:chgData name="Anh Minh Tran" userId="S::459379@muni.cz::b3788d88-cf3d-4b77-970d-ad61f246fa46" providerId="AD" clId="Web-{71F7E8E8-63C9-777B-2ABF-B238627A0230}" dt="2020-03-25T22:53:58.528" v="2" actId="20577"/>
+        <pc:sldMkLst>
+          <pc:docMk/>
+          <pc:sldMk cId="2167696870" sldId="263"/>
+        </pc:sldMkLst>
+        <pc:spChg chg="mod">
+          <ac:chgData name="Anh Minh Tran" userId="S::459379@muni.cz::b3788d88-cf3d-4b77-970d-ad61f246fa46" providerId="AD" clId="Web-{71F7E8E8-63C9-777B-2ABF-B238627A0230}" dt="2020-03-25T22:53:58.528" v="2" actId="20577"/>
+          <ac:spMkLst>
+            <pc:docMk/>
+            <pc:sldMk cId="2167696870" sldId="263"/>
+            <ac:spMk id="4" creationId="{C476DE12-CA91-4DA8-8433-90973EFA5D5F}"/>
+          </ac:spMkLst>
+        </pc:spChg>
+      </pc:sldChg>
+    </pc:docChg>
+  </pc:docChgLst>
+  <pc:docChgLst>
+    <pc:chgData name="Anh Minh Tran" userId="S::459379@muni.cz::b3788d88-cf3d-4b77-970d-ad61f246fa46" providerId="AD" clId="Web-{7D557538-294E-AFFE-B168-478C568E4451}"/>
+    <pc:docChg chg="modSld">
+      <pc:chgData name="Anh Minh Tran" userId="S::459379@muni.cz::b3788d88-cf3d-4b77-970d-ad61f246fa46" providerId="AD" clId="Web-{7D557538-294E-AFFE-B168-478C568E4451}" dt="2020-03-26T07:32:13.605" v="22" actId="20577"/>
+      <pc:docMkLst>
+        <pc:docMk/>
+      </pc:docMkLst>
+      <pc:sldChg chg="modSp">
+        <pc:chgData name="Anh Minh Tran" userId="S::459379@muni.cz::b3788d88-cf3d-4b77-970d-ad61f246fa46" providerId="AD" clId="Web-{7D557538-294E-AFFE-B168-478C568E4451}" dt="2020-03-26T07:32:13.605" v="21" actId="20577"/>
+        <pc:sldMkLst>
+          <pc:docMk/>
+          <pc:sldMk cId="2167696870" sldId="263"/>
+        </pc:sldMkLst>
+        <pc:spChg chg="mod">
+          <ac:chgData name="Anh Minh Tran" userId="S::459379@muni.cz::b3788d88-cf3d-4b77-970d-ad61f246fa46" providerId="AD" clId="Web-{7D557538-294E-AFFE-B168-478C568E4451}" dt="2020-03-26T07:32:13.605" v="21" actId="20577"/>
+          <ac:spMkLst>
+            <pc:docMk/>
+            <pc:sldMk cId="2167696870" sldId="263"/>
+            <ac:spMk id="3" creationId="{5FECEA1D-D165-4AB9-B5F3-A30CDE4336AB}"/>
+          </ac:spMkLst>
+        </pc:spChg>
+        <pc:spChg chg="mod">
+          <ac:chgData name="Anh Minh Tran" userId="S::459379@muni.cz::b3788d88-cf3d-4b77-970d-ad61f246fa46" providerId="AD" clId="Web-{7D557538-294E-AFFE-B168-478C568E4451}" dt="2020-03-26T07:31:09.886" v="9" actId="20577"/>
+          <ac:spMkLst>
+            <pc:docMk/>
+            <pc:sldMk cId="2167696870" sldId="263"/>
+            <ac:spMk id="4" creationId="{C476DE12-CA91-4DA8-8433-90973EFA5D5F}"/>
+          </ac:spMkLst>
+        </pc:spChg>
+      </pc:sldChg>
+    </pc:docChg>
+  </pc:docChgLst>
+</pc:chgInfo>
 </file>
 
 <file path=ppt/notesMasters/notesMaster1.xml><?xml version="1.0" encoding="utf-8"?>
@@ -235,7 +297,7 @@
           <a:p>
             <a:fld id="{682DB9DD-29FC-4A9E-B9FC-CB413008A6BF}" type="datetimeFigureOut">
               <a:rPr lang="en-US" smtClean="0"/>
-              <a:t>3/25/2020</a:t>
+              <a:t>3/26/2020</a:t>
             </a:fld>
             <a:endParaRPr lang="en-US"/>
           </a:p>
@@ -4055,39 +4117,83 @@
         </p:nvSpPr>
         <p:spPr/>
         <p:txBody>
-          <a:bodyPr>
-            <a:normAutofit fontScale="92500"/>
+          <a:bodyPr vert="horz" lIns="91440" tIns="45720" rIns="91440" bIns="45720" rtlCol="0" anchor="t">
+            <a:normAutofit/>
           </a:bodyPr>
           <a:lstStyle/>
           <a:p>
             <a:r>
-              <a:rPr lang="en-US" sz="1800" dirty="0"/>
-              <a:t>Main functions: </a:t>
-            </a:r>
-          </a:p>
-          <a:p>
-            <a:r>
-              <a:rPr lang="en-US" sz="1800" dirty="0"/>
+              <a:rPr lang="en-US" sz="1800" dirty="0">
+                <a:latin typeface="Arial"/>
+                <a:cs typeface="Arial"/>
+              </a:rPr>
+              <a:t>Main functions: </a:t>
+            </a:r>
+            <a:endParaRPr lang="en-US" sz="1800" dirty="0"/>
+          </a:p>
+          <a:p>
+            <a:pPr lvl="1"/>
+            <a:r>
+              <a:rPr lang="en-US" sz="1400" dirty="0">
+                <a:latin typeface="Arial"/>
+                <a:cs typeface="Arial"/>
+              </a:rPr>
               <a:t>monitoring data traffic</a:t>
             </a:r>
           </a:p>
           <a:p>
-            <a:r>
-              <a:rPr lang="en-US" sz="1800" dirty="0"/>
+            <a:pPr lvl="1"/>
+            <a:r>
+              <a:rPr lang="en-US" sz="1400" dirty="0">
+                <a:latin typeface="Arial"/>
+                <a:cs typeface="Arial"/>
+              </a:rPr>
               <a:t>protecting LAN/Internet interface (firewall)</a:t>
             </a:r>
           </a:p>
           <a:p>
             <a:r>
-              <a:rPr lang="en-US" sz="1800" dirty="0"/>
+              <a:rPr lang="en-US" sz="1800" dirty="0">
+                <a:latin typeface="Arial"/>
+                <a:cs typeface="Arial"/>
+              </a:rPr>
               <a:t>enabling the exchange of encrypted data (VPN)</a:t>
             </a:r>
           </a:p>
           <a:p>
             <a:r>
-              <a:rPr lang="en-US" sz="1800" dirty="0"/>
-              <a:t>Optional SIP relay functionality consists only of the software (on CD or USB) and its documentation checksum of software on CD/USB provided cryptographic algorithms are part of TOE, e.g. RNG</a:t>
-            </a:r>
+              <a:rPr lang="en-US" sz="1800" dirty="0">
+                <a:latin typeface="Arial"/>
+                <a:cs typeface="Arial"/>
+              </a:rPr>
+              <a:t>Optional SIP relay functionality</a:t>
+            </a:r>
+          </a:p>
+          <a:p>
+            <a:r>
+              <a:rPr lang="en-US" sz="1800" dirty="0">
+                <a:latin typeface="Arial"/>
+                <a:cs typeface="Arial"/>
+              </a:rPr>
+              <a:t> consists only of the software (on CD or USB) and its documentation  provided</a:t>
+            </a:r>
+            <a:endParaRPr lang="en-US" dirty="0">
+              <a:latin typeface="Arial"/>
+              <a:cs typeface="Arial"/>
+            </a:endParaRPr>
+          </a:p>
+          <a:p>
+            <a:r>
+              <a:rPr lang="en-US" sz="1800" dirty="0">
+                <a:latin typeface="Arial"/>
+                <a:cs typeface="Arial"/>
+              </a:rPr>
+              <a:t>Cryptographic algorithms are part of TOE, e.g. RNG</a:t>
+            </a:r>
+            <a:endParaRPr lang="en-US">
+              <a:latin typeface="Arial"/>
+              <a:cs typeface="Arial"/>
+            </a:endParaRPr>
           </a:p>
         </p:txBody>
       </p:sp>
@@ -4110,22 +4216,22 @@
         <p:spPr/>
         <p:txBody>
           <a:bodyPr vert="horz" lIns="91440" tIns="45720" rIns="91440" bIns="45720" rtlCol="0" anchor="t">
-            <a:normAutofit fontScale="92500"/>
+            <a:normAutofit/>
           </a:bodyPr>
           <a:lstStyle/>
           <a:p>
             <a:r>
-              <a:rPr lang="en-US" sz="2300" dirty="0">
+              <a:rPr lang="en-US" sz="2000" dirty="0">
                 <a:latin typeface="Arial"/>
                 <a:cs typeface="Arial"/>
               </a:rPr>
               <a:t>EAL 4+</a:t>
             </a:r>
-            <a:endParaRPr lang="en-US" sz="2300" dirty="0"/>
-          </a:p>
-          <a:p>
-            <a:r>
-              <a:rPr lang="en-US" sz="2300" dirty="0">
+            <a:endParaRPr lang="en-US" sz="2000"/>
+          </a:p>
+          <a:p>
+            <a:r>
+              <a:rPr lang="en-US" sz="2000" dirty="0">
                 <a:latin typeface="Arial"/>
                 <a:cs typeface="Arial"/>
               </a:rPr>
@@ -4134,7 +4240,7 @@
           </a:p>
           <a:p>
             <a:r>
-              <a:rPr lang="en-US" sz="2300" dirty="0">
+              <a:rPr lang="en-US" sz="2000" dirty="0">
                 <a:latin typeface="Arial"/>
                 <a:cs typeface="Arial"/>
               </a:rPr>
@@ -4143,7 +4249,7 @@
           </a:p>
           <a:p>
             <a:r>
-              <a:rPr lang="en-US" sz="2300" dirty="0">
+              <a:rPr lang="en-US" sz="2000" dirty="0">
                 <a:latin typeface="Arial"/>
                 <a:cs typeface="Arial"/>
               </a:rPr>
@@ -4152,7 +4258,7 @@
           </a:p>
           <a:p>
             <a:r>
-              <a:rPr lang="en-US" sz="2300" dirty="0">
+              <a:rPr lang="en-US" sz="2000" dirty="0">
                 <a:latin typeface="Arial"/>
                 <a:cs typeface="Arial"/>
               </a:rPr>
@@ -4161,7 +4267,7 @@
           </a:p>
           <a:p>
             <a:r>
-              <a:rPr lang="en-US" sz="2300" dirty="0">
+              <a:rPr lang="en-US" sz="2000" dirty="0">
                 <a:latin typeface="Arial"/>
                 <a:cs typeface="Arial"/>
               </a:rPr>

</xml_diff>